<commit_message>
Implements Virtual Controller System
</commit_message>
<xml_diff>
--- a/Planning/UI Concepts.pptx
+++ b/Planning/UI Concepts.pptx
@@ -238,6 +238,7 @@
           <a:p>
             <a:fld id="{AF78B45F-0BE3-460E-81D0-51B54B542B88}" type="datetimeFigureOut">
               <a:rPr lang="en-US" smtClean="0"/>
+              <a:pPr/>
               <a:t>3/18/2015</a:t>
             </a:fld>
             <a:endParaRPr lang="en-US"/>
@@ -280,6 +281,7 @@
           <a:p>
             <a:fld id="{D657D587-91CA-44A1-BE79-21B5C32086CB}" type="slidenum">
               <a:rPr lang="en-US" smtClean="0"/>
+              <a:pPr/>
               <a:t>‹#›</a:t>
             </a:fld>
             <a:endParaRPr lang="en-US"/>
@@ -289,7 +291,7 @@
     </p:spTree>
     <p:extLst>
       <p:ext uri="{BB962C8B-B14F-4D97-AF65-F5344CB8AC3E}">
-        <p14:creationId xmlns:p14="http://schemas.microsoft.com/office/powerpoint/2010/main" val="3967994096"/>
+        <p14:creationId xmlns:p14="http://schemas.microsoft.com/office/powerpoint/2010/main" xmlns="" val="3967994096"/>
       </p:ext>
     </p:extLst>
   </p:cSld>
@@ -408,6 +410,7 @@
           <a:p>
             <a:fld id="{AF78B45F-0BE3-460E-81D0-51B54B542B88}" type="datetimeFigureOut">
               <a:rPr lang="en-US" smtClean="0"/>
+              <a:pPr/>
               <a:t>3/18/2015</a:t>
             </a:fld>
             <a:endParaRPr lang="en-US"/>
@@ -450,6 +453,7 @@
           <a:p>
             <a:fld id="{D657D587-91CA-44A1-BE79-21B5C32086CB}" type="slidenum">
               <a:rPr lang="en-US" smtClean="0"/>
+              <a:pPr/>
               <a:t>‹#›</a:t>
             </a:fld>
             <a:endParaRPr lang="en-US"/>
@@ -459,7 +463,7 @@
     </p:spTree>
     <p:extLst>
       <p:ext uri="{BB962C8B-B14F-4D97-AF65-F5344CB8AC3E}">
-        <p14:creationId xmlns:p14="http://schemas.microsoft.com/office/powerpoint/2010/main" val="345183836"/>
+        <p14:creationId xmlns:p14="http://schemas.microsoft.com/office/powerpoint/2010/main" xmlns="" val="345183836"/>
       </p:ext>
     </p:extLst>
   </p:cSld>
@@ -588,6 +592,7 @@
           <a:p>
             <a:fld id="{AF78B45F-0BE3-460E-81D0-51B54B542B88}" type="datetimeFigureOut">
               <a:rPr lang="en-US" smtClean="0"/>
+              <a:pPr/>
               <a:t>3/18/2015</a:t>
             </a:fld>
             <a:endParaRPr lang="en-US"/>
@@ -630,6 +635,7 @@
           <a:p>
             <a:fld id="{D657D587-91CA-44A1-BE79-21B5C32086CB}" type="slidenum">
               <a:rPr lang="en-US" smtClean="0"/>
+              <a:pPr/>
               <a:t>‹#›</a:t>
             </a:fld>
             <a:endParaRPr lang="en-US"/>
@@ -639,7 +645,7 @@
     </p:spTree>
     <p:extLst>
       <p:ext uri="{BB962C8B-B14F-4D97-AF65-F5344CB8AC3E}">
-        <p14:creationId xmlns:p14="http://schemas.microsoft.com/office/powerpoint/2010/main" val="3214298054"/>
+        <p14:creationId xmlns:p14="http://schemas.microsoft.com/office/powerpoint/2010/main" xmlns="" val="3214298054"/>
       </p:ext>
     </p:extLst>
   </p:cSld>
@@ -758,6 +764,7 @@
           <a:p>
             <a:fld id="{AF78B45F-0BE3-460E-81D0-51B54B542B88}" type="datetimeFigureOut">
               <a:rPr lang="en-US" smtClean="0"/>
+              <a:pPr/>
               <a:t>3/18/2015</a:t>
             </a:fld>
             <a:endParaRPr lang="en-US"/>
@@ -800,6 +807,7 @@
           <a:p>
             <a:fld id="{D657D587-91CA-44A1-BE79-21B5C32086CB}" type="slidenum">
               <a:rPr lang="en-US" smtClean="0"/>
+              <a:pPr/>
               <a:t>‹#›</a:t>
             </a:fld>
             <a:endParaRPr lang="en-US"/>
@@ -809,7 +817,7 @@
     </p:spTree>
     <p:extLst>
       <p:ext uri="{BB962C8B-B14F-4D97-AF65-F5344CB8AC3E}">
-        <p14:creationId xmlns:p14="http://schemas.microsoft.com/office/powerpoint/2010/main" val="1338401994"/>
+        <p14:creationId xmlns:p14="http://schemas.microsoft.com/office/powerpoint/2010/main" xmlns="" val="1338401994"/>
       </p:ext>
     </p:extLst>
   </p:cSld>
@@ -1004,6 +1012,7 @@
           <a:p>
             <a:fld id="{AF78B45F-0BE3-460E-81D0-51B54B542B88}" type="datetimeFigureOut">
               <a:rPr lang="en-US" smtClean="0"/>
+              <a:pPr/>
               <a:t>3/18/2015</a:t>
             </a:fld>
             <a:endParaRPr lang="en-US"/>
@@ -1046,6 +1055,7 @@
           <a:p>
             <a:fld id="{D657D587-91CA-44A1-BE79-21B5C32086CB}" type="slidenum">
               <a:rPr lang="en-US" smtClean="0"/>
+              <a:pPr/>
               <a:t>‹#›</a:t>
             </a:fld>
             <a:endParaRPr lang="en-US"/>
@@ -1055,7 +1065,7 @@
     </p:spTree>
     <p:extLst>
       <p:ext uri="{BB962C8B-B14F-4D97-AF65-F5344CB8AC3E}">
-        <p14:creationId xmlns:p14="http://schemas.microsoft.com/office/powerpoint/2010/main" val="2251080268"/>
+        <p14:creationId xmlns:p14="http://schemas.microsoft.com/office/powerpoint/2010/main" xmlns="" val="2251080268"/>
       </p:ext>
     </p:extLst>
   </p:cSld>
@@ -1236,6 +1246,7 @@
           <a:p>
             <a:fld id="{AF78B45F-0BE3-460E-81D0-51B54B542B88}" type="datetimeFigureOut">
               <a:rPr lang="en-US" smtClean="0"/>
+              <a:pPr/>
               <a:t>3/18/2015</a:t>
             </a:fld>
             <a:endParaRPr lang="en-US"/>
@@ -1278,6 +1289,7 @@
           <a:p>
             <a:fld id="{D657D587-91CA-44A1-BE79-21B5C32086CB}" type="slidenum">
               <a:rPr lang="en-US" smtClean="0"/>
+              <a:pPr/>
               <a:t>‹#›</a:t>
             </a:fld>
             <a:endParaRPr lang="en-US"/>
@@ -1287,7 +1299,7 @@
     </p:spTree>
     <p:extLst>
       <p:ext uri="{BB962C8B-B14F-4D97-AF65-F5344CB8AC3E}">
-        <p14:creationId xmlns:p14="http://schemas.microsoft.com/office/powerpoint/2010/main" val="3385327435"/>
+        <p14:creationId xmlns:p14="http://schemas.microsoft.com/office/powerpoint/2010/main" xmlns="" val="3385327435"/>
       </p:ext>
     </p:extLst>
   </p:cSld>
@@ -1603,6 +1615,7 @@
           <a:p>
             <a:fld id="{AF78B45F-0BE3-460E-81D0-51B54B542B88}" type="datetimeFigureOut">
               <a:rPr lang="en-US" smtClean="0"/>
+              <a:pPr/>
               <a:t>3/18/2015</a:t>
             </a:fld>
             <a:endParaRPr lang="en-US"/>
@@ -1645,6 +1658,7 @@
           <a:p>
             <a:fld id="{D657D587-91CA-44A1-BE79-21B5C32086CB}" type="slidenum">
               <a:rPr lang="en-US" smtClean="0"/>
+              <a:pPr/>
               <a:t>‹#›</a:t>
             </a:fld>
             <a:endParaRPr lang="en-US"/>
@@ -1654,7 +1668,7 @@
     </p:spTree>
     <p:extLst>
       <p:ext uri="{BB962C8B-B14F-4D97-AF65-F5344CB8AC3E}">
-        <p14:creationId xmlns:p14="http://schemas.microsoft.com/office/powerpoint/2010/main" val="1716760183"/>
+        <p14:creationId xmlns:p14="http://schemas.microsoft.com/office/powerpoint/2010/main" xmlns="" val="1716760183"/>
       </p:ext>
     </p:extLst>
   </p:cSld>
@@ -1721,6 +1735,7 @@
           <a:p>
             <a:fld id="{AF78B45F-0BE3-460E-81D0-51B54B542B88}" type="datetimeFigureOut">
               <a:rPr lang="en-US" smtClean="0"/>
+              <a:pPr/>
               <a:t>3/18/2015</a:t>
             </a:fld>
             <a:endParaRPr lang="en-US"/>
@@ -1763,6 +1778,7 @@
           <a:p>
             <a:fld id="{D657D587-91CA-44A1-BE79-21B5C32086CB}" type="slidenum">
               <a:rPr lang="en-US" smtClean="0"/>
+              <a:pPr/>
               <a:t>‹#›</a:t>
             </a:fld>
             <a:endParaRPr lang="en-US"/>
@@ -1772,7 +1788,7 @@
     </p:spTree>
     <p:extLst>
       <p:ext uri="{BB962C8B-B14F-4D97-AF65-F5344CB8AC3E}">
-        <p14:creationId xmlns:p14="http://schemas.microsoft.com/office/powerpoint/2010/main" val="244422436"/>
+        <p14:creationId xmlns:p14="http://schemas.microsoft.com/office/powerpoint/2010/main" xmlns="" val="244422436"/>
       </p:ext>
     </p:extLst>
   </p:cSld>
@@ -1816,6 +1832,7 @@
           <a:p>
             <a:fld id="{AF78B45F-0BE3-460E-81D0-51B54B542B88}" type="datetimeFigureOut">
               <a:rPr lang="en-US" smtClean="0"/>
+              <a:pPr/>
               <a:t>3/18/2015</a:t>
             </a:fld>
             <a:endParaRPr lang="en-US"/>
@@ -1858,6 +1875,7 @@
           <a:p>
             <a:fld id="{D657D587-91CA-44A1-BE79-21B5C32086CB}" type="slidenum">
               <a:rPr lang="en-US" smtClean="0"/>
+              <a:pPr/>
               <a:t>‹#›</a:t>
             </a:fld>
             <a:endParaRPr lang="en-US"/>
@@ -1867,7 +1885,7 @@
     </p:spTree>
     <p:extLst>
       <p:ext uri="{BB962C8B-B14F-4D97-AF65-F5344CB8AC3E}">
-        <p14:creationId xmlns:p14="http://schemas.microsoft.com/office/powerpoint/2010/main" val="756473966"/>
+        <p14:creationId xmlns:p14="http://schemas.microsoft.com/office/powerpoint/2010/main" xmlns="" val="756473966"/>
       </p:ext>
     </p:extLst>
   </p:cSld>
@@ -2093,6 +2111,7 @@
           <a:p>
             <a:fld id="{AF78B45F-0BE3-460E-81D0-51B54B542B88}" type="datetimeFigureOut">
               <a:rPr lang="en-US" smtClean="0"/>
+              <a:pPr/>
               <a:t>3/18/2015</a:t>
             </a:fld>
             <a:endParaRPr lang="en-US"/>
@@ -2135,6 +2154,7 @@
           <a:p>
             <a:fld id="{D657D587-91CA-44A1-BE79-21B5C32086CB}" type="slidenum">
               <a:rPr lang="en-US" smtClean="0"/>
+              <a:pPr/>
               <a:t>‹#›</a:t>
             </a:fld>
             <a:endParaRPr lang="en-US"/>
@@ -2144,7 +2164,7 @@
     </p:spTree>
     <p:extLst>
       <p:ext uri="{BB962C8B-B14F-4D97-AF65-F5344CB8AC3E}">
-        <p14:creationId xmlns:p14="http://schemas.microsoft.com/office/powerpoint/2010/main" val="726442546"/>
+        <p14:creationId xmlns:p14="http://schemas.microsoft.com/office/powerpoint/2010/main" xmlns="" val="726442546"/>
       </p:ext>
     </p:extLst>
   </p:cSld>
@@ -2346,6 +2366,7 @@
           <a:p>
             <a:fld id="{AF78B45F-0BE3-460E-81D0-51B54B542B88}" type="datetimeFigureOut">
               <a:rPr lang="en-US" smtClean="0"/>
+              <a:pPr/>
               <a:t>3/18/2015</a:t>
             </a:fld>
             <a:endParaRPr lang="en-US"/>
@@ -2388,6 +2409,7 @@
           <a:p>
             <a:fld id="{D657D587-91CA-44A1-BE79-21B5C32086CB}" type="slidenum">
               <a:rPr lang="en-US" smtClean="0"/>
+              <a:pPr/>
               <a:t>‹#›</a:t>
             </a:fld>
             <a:endParaRPr lang="en-US"/>
@@ -2397,7 +2419,7 @@
     </p:spTree>
     <p:extLst>
       <p:ext uri="{BB962C8B-B14F-4D97-AF65-F5344CB8AC3E}">
-        <p14:creationId xmlns:p14="http://schemas.microsoft.com/office/powerpoint/2010/main" val="2482943667"/>
+        <p14:creationId xmlns:p14="http://schemas.microsoft.com/office/powerpoint/2010/main" xmlns="" val="2482943667"/>
       </p:ext>
     </p:extLst>
   </p:cSld>
@@ -2559,6 +2581,7 @@
           <a:p>
             <a:fld id="{AF78B45F-0BE3-460E-81D0-51B54B542B88}" type="datetimeFigureOut">
               <a:rPr lang="en-US" smtClean="0"/>
+              <a:pPr/>
               <a:t>3/18/2015</a:t>
             </a:fld>
             <a:endParaRPr lang="en-US"/>
@@ -2637,6 +2660,7 @@
           <a:p>
             <a:fld id="{D657D587-91CA-44A1-BE79-21B5C32086CB}" type="slidenum">
               <a:rPr lang="en-US" smtClean="0"/>
+              <a:pPr/>
               <a:t>‹#›</a:t>
             </a:fld>
             <a:endParaRPr lang="en-US"/>
@@ -2646,7 +2670,7 @@
     </p:spTree>
     <p:extLst>
       <p:ext uri="{BB962C8B-B14F-4D97-AF65-F5344CB8AC3E}">
-        <p14:creationId xmlns:p14="http://schemas.microsoft.com/office/powerpoint/2010/main" val="1002553876"/>
+        <p14:creationId xmlns:p14="http://schemas.microsoft.com/office/powerpoint/2010/main" xmlns="" val="1002553876"/>
       </p:ext>
     </p:extLst>
   </p:cSld>
@@ -2972,8 +2996,8 @@
         </p:nvSpPr>
         <p:spPr>
           <a:xfrm>
-            <a:off x="6985000" y="2373868"/>
-            <a:ext cx="4864100" cy="830997"/>
+            <a:off x="5391807" y="2373868"/>
+            <a:ext cx="6457293" cy="830997"/>
           </a:xfrm>
           <a:prstGeom prst="rect">
             <a:avLst/>
@@ -3026,7 +3050,7 @@
               <a:rPr lang="en-US" dirty="0" smtClean="0">
                 <a:solidFill>
                   <a:schemeClr val="bg2">
-                    <a:lumMod val="25000"/>
+                    <a:lumMod val="50000"/>
                   </a:schemeClr>
                 </a:solidFill>
                 <a:latin typeface="Chaparral Pro" panose="02060503040505020203" pitchFamily="18" charset="0"/>
@@ -3036,7 +3060,7 @@
             <a:endParaRPr lang="en-US" dirty="0">
               <a:solidFill>
                 <a:schemeClr val="bg2">
-                  <a:lumMod val="25000"/>
+                  <a:lumMod val="50000"/>
                 </a:schemeClr>
               </a:solidFill>
               <a:latin typeface="Chaparral Pro" panose="02060503040505020203" pitchFamily="18" charset="0"/>
@@ -3071,7 +3095,7 @@
               <a:rPr lang="en-US" dirty="0" smtClean="0">
                 <a:solidFill>
                   <a:schemeClr val="bg2">
-                    <a:lumMod val="25000"/>
+                    <a:lumMod val="50000"/>
                   </a:schemeClr>
                 </a:solidFill>
                 <a:latin typeface="Chaparral Pro" panose="02060503040505020203" pitchFamily="18" charset="0"/>
@@ -3081,7 +3105,7 @@
             <a:endParaRPr lang="en-US" dirty="0">
               <a:solidFill>
                 <a:schemeClr val="bg2">
-                  <a:lumMod val="25000"/>
+                  <a:lumMod val="50000"/>
                 </a:schemeClr>
               </a:solidFill>
               <a:latin typeface="Chaparral Pro" panose="02060503040505020203" pitchFamily="18" charset="0"/>
@@ -3116,7 +3140,7 @@
               <a:rPr lang="en-US" dirty="0" smtClean="0">
                 <a:solidFill>
                   <a:schemeClr val="bg2">
-                    <a:lumMod val="25000"/>
+                    <a:lumMod val="50000"/>
                   </a:schemeClr>
                 </a:solidFill>
                 <a:latin typeface="Chaparral Pro" panose="02060503040505020203" pitchFamily="18" charset="0"/>
@@ -3126,7 +3150,7 @@
             <a:endParaRPr lang="en-US" dirty="0">
               <a:solidFill>
                 <a:schemeClr val="bg2">
-                  <a:lumMod val="25000"/>
+                  <a:lumMod val="50000"/>
                 </a:schemeClr>
               </a:solidFill>
               <a:latin typeface="Chaparral Pro" panose="02060503040505020203" pitchFamily="18" charset="0"/>
@@ -3137,7 +3161,7 @@
     </p:spTree>
     <p:extLst>
       <p:ext uri="{BB962C8B-B14F-4D97-AF65-F5344CB8AC3E}">
-        <p14:creationId xmlns:p14="http://schemas.microsoft.com/office/powerpoint/2010/main" val="32769425"/>
+        <p14:creationId xmlns:p14="http://schemas.microsoft.com/office/powerpoint/2010/main" xmlns="" val="32769425"/>
       </p:ext>
     </p:extLst>
   </p:cSld>
@@ -3508,7 +3532,7 @@
     </a:clrScheme>
     <a:fontScheme name="Office">
       <a:majorFont>
-        <a:latin typeface="Calibri Light" panose="020F0302020204030204"/>
+        <a:latin typeface="Calibri Light"/>
         <a:ea typeface=""/>
         <a:cs typeface=""/>
         <a:font script="Jpan" typeface="ＭＳ Ｐゴシック"/>
@@ -3543,7 +3567,7 @@
         <a:font script="Geor" typeface="Sylfaen"/>
       </a:majorFont>
       <a:minorFont>
-        <a:latin typeface="Calibri" panose="020F0502020204030204"/>
+        <a:latin typeface="Calibri"/>
         <a:ea typeface=""/>
         <a:cs typeface=""/>
         <a:font script="Jpan" typeface="ＭＳ Ｐゴシック"/>
@@ -3720,7 +3744,7 @@
   <a:extraClrSchemeLst/>
   <a:extLst>
     <a:ext uri="{05A4C25C-085E-4340-85A3-A5531E510DB2}">
-      <thm15:themeFamily xmlns:thm15="http://schemas.microsoft.com/office/thememl/2012/main" name="Office Theme" id="{62F939B6-93AF-4DB8-9C6B-D6C7DFDC589F}" vid="{4A3C46E8-61CC-4603-A589-7422A47A8E4A}"/>
+      <thm15:themeFamily xmlns:thm15="http://schemas.microsoft.com/office/thememl/2012/main" xmlns="" name="Office Theme" id="{62F939B6-93AF-4DB8-9C6B-D6C7DFDC589F}" vid="{4A3C46E8-61CC-4603-A589-7422A47A8E4A}"/>
     </a:ext>
   </a:extLst>
 </a:theme>

</xml_diff>